<commit_message>
previous sentence, number of previous words unclassified.
</commit_message>
<xml_diff>
--- a/Poster.pptx
+++ b/Poster.pptx
@@ -5,18 +5,20 @@
     <p:sldMasterId id="2147483648" r:id="rId1"/>
   </p:sldMasterIdLst>
   <p:notesMasterIdLst>
-    <p:notesMasterId r:id="rId11"/>
+    <p:notesMasterId r:id="rId13"/>
   </p:notesMasterIdLst>
   <p:sldIdLst>
     <p:sldId id="256" r:id="rId2"/>
-    <p:sldId id="257" r:id="rId3"/>
-    <p:sldId id="258" r:id="rId4"/>
-    <p:sldId id="259" r:id="rId5"/>
-    <p:sldId id="260" r:id="rId6"/>
-    <p:sldId id="261" r:id="rId7"/>
-    <p:sldId id="262" r:id="rId8"/>
-    <p:sldId id="263" r:id="rId9"/>
-    <p:sldId id="264" r:id="rId10"/>
+    <p:sldId id="266" r:id="rId3"/>
+    <p:sldId id="257" r:id="rId4"/>
+    <p:sldId id="258" r:id="rId5"/>
+    <p:sldId id="259" r:id="rId6"/>
+    <p:sldId id="260" r:id="rId7"/>
+    <p:sldId id="261" r:id="rId8"/>
+    <p:sldId id="262" r:id="rId9"/>
+    <p:sldId id="265" r:id="rId10"/>
+    <p:sldId id="263" r:id="rId11"/>
+    <p:sldId id="264" r:id="rId12"/>
   </p:sldIdLst>
   <p:sldSz cx="9144000" cy="6858000" type="screen4x3"/>
   <p:notesSz cx="6858000" cy="9144000"/>
@@ -591,6 +593,280 @@
               <a:rPr lang="en-US" smtClean="0"/>
               <a:pPr/>
               <a:t>1</a:t>
+            </a:fld>
+            <a:endParaRPr lang="en-US"/>
+          </a:p>
+        </p:txBody>
+      </p:sp>
+    </p:spTree>
+  </p:cSld>
+  <p:clrMapOvr>
+    <a:masterClrMapping/>
+  </p:clrMapOvr>
+</p:notes>
+</file>
+
+<file path=ppt/notesSlides/notesSlide10.xml><?xml version="1.0" encoding="utf-8"?>
+<p:notes xmlns:a="http://schemas.openxmlformats.org/drawingml/2006/main" xmlns:r="http://schemas.openxmlformats.org/officeDocument/2006/relationships" xmlns:mc="http://schemas.openxmlformats.org/markup-compatibility/2006" xmlns:mv="urn:schemas-microsoft-com:mac:vml" xmlns:p="http://schemas.openxmlformats.org/presentationml/2006/main" mc:Ignorable="mv" mc:PreserveAttributes="mv:*">
+  <p:cSld>
+    <p:spTree>
+      <p:nvGrpSpPr>
+        <p:cNvPr id="1" name=""/>
+        <p:cNvGrpSpPr/>
+        <p:nvPr/>
+      </p:nvGrpSpPr>
+      <p:grpSpPr>
+        <a:xfrm>
+          <a:off x="0" y="0"/>
+          <a:ext cx="0" cy="0"/>
+          <a:chOff x="0" y="0"/>
+          <a:chExt cx="0" cy="0"/>
+        </a:xfrm>
+      </p:grpSpPr>
+      <p:sp>
+        <p:nvSpPr>
+          <p:cNvPr id="2" name="Slide Image Placeholder 1"/>
+          <p:cNvSpPr>
+            <a:spLocks noGrp="1" noRot="1" noChangeAspect="1"/>
+          </p:cNvSpPr>
+          <p:nvPr>
+            <p:ph type="sldImg"/>
+          </p:nvPr>
+        </p:nvSpPr>
+        <p:spPr/>
+      </p:sp>
+      <p:sp>
+        <p:nvSpPr>
+          <p:cNvPr id="3" name="Notes Placeholder 2"/>
+          <p:cNvSpPr>
+            <a:spLocks noGrp="1"/>
+          </p:cNvSpPr>
+          <p:nvPr>
+            <p:ph type="body" idx="1"/>
+          </p:nvPr>
+        </p:nvSpPr>
+        <p:spPr/>
+        <p:txBody>
+          <a:bodyPr>
+            <a:normAutofit/>
+          </a:bodyPr>
+          <a:lstStyle/>
+          <a:p>
+            <a:r>
+              <a:rPr lang="en-US" sz="1200" kern="1200" dirty="0" smtClean="0">
+                <a:solidFill>
+                  <a:schemeClr val="tx1"/>
+                </a:solidFill>
+                <a:latin typeface="+mn-lt"/>
+                <a:ea typeface="+mn-ea"/>
+                <a:cs typeface="+mn-cs"/>
+              </a:rPr>
+              <a:t>1) Title and people 2) A slide on explaining </a:t>
+            </a:r>
+            <a:r>
+              <a:rPr lang="en-US" sz="1200" kern="1200" dirty="0" err="1" smtClean="0">
+                <a:solidFill>
+                  <a:schemeClr val="tx1"/>
+                </a:solidFill>
+                <a:latin typeface="+mn-lt"/>
+                <a:ea typeface="+mn-ea"/>
+                <a:cs typeface="+mn-cs"/>
+              </a:rPr>
+              <a:t>disfluencies</a:t>
+            </a:r>
+            <a:r>
+              <a:rPr lang="en-US" sz="1200" kern="1200" dirty="0" smtClean="0">
+                <a:solidFill>
+                  <a:schemeClr val="tx1"/>
+                </a:solidFill>
+                <a:latin typeface="+mn-lt"/>
+                <a:ea typeface="+mn-ea"/>
+                <a:cs typeface="+mn-cs"/>
+              </a:rPr>
+              <a:t> (examples: question, backchannel, statement)3) A slide on the data available4) Effect of pre-pos tags: 1, 2, 3 grams. Effect of pre-pos tags: 1, 2, 3 grams. Bin sizes.5) Club backchannel words into a class (</a:t>
+            </a:r>
+            <a:r>
+              <a:rPr lang="en-US" sz="1200" kern="1200" dirty="0" err="1" smtClean="0">
+                <a:solidFill>
+                  <a:schemeClr val="tx1"/>
+                </a:solidFill>
+                <a:latin typeface="+mn-lt"/>
+                <a:ea typeface="+mn-ea"/>
+                <a:cs typeface="+mn-cs"/>
+              </a:rPr>
+              <a:t>mhm</a:t>
+            </a:r>
+            <a:r>
+              <a:rPr lang="en-US" sz="1200" kern="1200" dirty="0" smtClean="0">
+                <a:solidFill>
+                  <a:schemeClr val="tx1"/>
+                </a:solidFill>
+                <a:latin typeface="+mn-lt"/>
+                <a:ea typeface="+mn-ea"/>
+                <a:cs typeface="+mn-cs"/>
+              </a:rPr>
+              <a:t>, oh yeah)6) Features based on prior sentence tag     Switchboard versus Fisher data7) Prosodic features effects of energy, F0, pause duration 8) Average F0 based feature9) References</a:t>
+            </a:r>
+            <a:endParaRPr lang="en-US" dirty="0"/>
+          </a:p>
+        </p:txBody>
+      </p:sp>
+      <p:sp>
+        <p:nvSpPr>
+          <p:cNvPr id="4" name="Slide Number Placeholder 3"/>
+          <p:cNvSpPr>
+            <a:spLocks noGrp="1"/>
+          </p:cNvSpPr>
+          <p:nvPr>
+            <p:ph type="sldNum" sz="quarter" idx="10"/>
+          </p:nvPr>
+        </p:nvSpPr>
+        <p:spPr/>
+        <p:txBody>
+          <a:bodyPr/>
+          <a:lstStyle/>
+          <a:p>
+            <a:fld id="{7B5AD275-BDE2-3E4D-BC56-6FC6FA0523E9}" type="slidenum">
+              <a:rPr lang="en-US" smtClean="0"/>
+              <a:pPr/>
+              <a:t>10</a:t>
+            </a:fld>
+            <a:endParaRPr lang="en-US"/>
+          </a:p>
+        </p:txBody>
+      </p:sp>
+    </p:spTree>
+  </p:cSld>
+  <p:clrMapOvr>
+    <a:masterClrMapping/>
+  </p:clrMapOvr>
+</p:notes>
+</file>
+
+<file path=ppt/notesSlides/notesSlide11.xml><?xml version="1.0" encoding="utf-8"?>
+<p:notes xmlns:a="http://schemas.openxmlformats.org/drawingml/2006/main" xmlns:r="http://schemas.openxmlformats.org/officeDocument/2006/relationships" xmlns:mc="http://schemas.openxmlformats.org/markup-compatibility/2006" xmlns:mv="urn:schemas-microsoft-com:mac:vml" xmlns:p="http://schemas.openxmlformats.org/presentationml/2006/main" mc:Ignorable="mv" mc:PreserveAttributes="mv:*">
+  <p:cSld>
+    <p:spTree>
+      <p:nvGrpSpPr>
+        <p:cNvPr id="1" name=""/>
+        <p:cNvGrpSpPr/>
+        <p:nvPr/>
+      </p:nvGrpSpPr>
+      <p:grpSpPr>
+        <a:xfrm>
+          <a:off x="0" y="0"/>
+          <a:ext cx="0" cy="0"/>
+          <a:chOff x="0" y="0"/>
+          <a:chExt cx="0" cy="0"/>
+        </a:xfrm>
+      </p:grpSpPr>
+      <p:sp>
+        <p:nvSpPr>
+          <p:cNvPr id="2" name="Slide Image Placeholder 1"/>
+          <p:cNvSpPr>
+            <a:spLocks noGrp="1" noRot="1" noChangeAspect="1"/>
+          </p:cNvSpPr>
+          <p:nvPr>
+            <p:ph type="sldImg"/>
+          </p:nvPr>
+        </p:nvSpPr>
+        <p:spPr/>
+      </p:sp>
+      <p:sp>
+        <p:nvSpPr>
+          <p:cNvPr id="3" name="Notes Placeholder 2"/>
+          <p:cNvSpPr>
+            <a:spLocks noGrp="1"/>
+          </p:cNvSpPr>
+          <p:nvPr>
+            <p:ph type="body" idx="1"/>
+          </p:nvPr>
+        </p:nvSpPr>
+        <p:spPr/>
+        <p:txBody>
+          <a:bodyPr>
+            <a:normAutofit/>
+          </a:bodyPr>
+          <a:lstStyle/>
+          <a:p>
+            <a:r>
+              <a:rPr lang="en-US" sz="1200" kern="1200" dirty="0" smtClean="0">
+                <a:solidFill>
+                  <a:schemeClr val="tx1"/>
+                </a:solidFill>
+                <a:latin typeface="+mn-lt"/>
+                <a:ea typeface="+mn-ea"/>
+                <a:cs typeface="+mn-cs"/>
+              </a:rPr>
+              <a:t>1) Title and people 2) A slide on explaining </a:t>
+            </a:r>
+            <a:r>
+              <a:rPr lang="en-US" sz="1200" kern="1200" dirty="0" err="1" smtClean="0">
+                <a:solidFill>
+                  <a:schemeClr val="tx1"/>
+                </a:solidFill>
+                <a:latin typeface="+mn-lt"/>
+                <a:ea typeface="+mn-ea"/>
+                <a:cs typeface="+mn-cs"/>
+              </a:rPr>
+              <a:t>disfluencies</a:t>
+            </a:r>
+            <a:r>
+              <a:rPr lang="en-US" sz="1200" kern="1200" dirty="0" smtClean="0">
+                <a:solidFill>
+                  <a:schemeClr val="tx1"/>
+                </a:solidFill>
+                <a:latin typeface="+mn-lt"/>
+                <a:ea typeface="+mn-ea"/>
+                <a:cs typeface="+mn-cs"/>
+              </a:rPr>
+              <a:t> (examples: question, backchannel, statement)3) A slide on the data available4) Effect of pre-pos tags: 1, 2, 3 grams. Effect of pre-pos tags: 1, 2, 3 grams. Bin sizes.5) Club backchannel words into a class (</a:t>
+            </a:r>
+            <a:r>
+              <a:rPr lang="en-US" sz="1200" kern="1200" dirty="0" err="1" smtClean="0">
+                <a:solidFill>
+                  <a:schemeClr val="tx1"/>
+                </a:solidFill>
+                <a:latin typeface="+mn-lt"/>
+                <a:ea typeface="+mn-ea"/>
+                <a:cs typeface="+mn-cs"/>
+              </a:rPr>
+              <a:t>mhm</a:t>
+            </a:r>
+            <a:r>
+              <a:rPr lang="en-US" sz="1200" kern="1200" dirty="0" smtClean="0">
+                <a:solidFill>
+                  <a:schemeClr val="tx1"/>
+                </a:solidFill>
+                <a:latin typeface="+mn-lt"/>
+                <a:ea typeface="+mn-ea"/>
+                <a:cs typeface="+mn-cs"/>
+              </a:rPr>
+              <a:t>, oh yeah)6) Features based on prior sentence tag     Switchboard versus Fisher data7) Prosodic features effects of energy, F0, pause duration 8) Average F0 based feature9) References</a:t>
+            </a:r>
+            <a:endParaRPr lang="en-US" dirty="0"/>
+          </a:p>
+        </p:txBody>
+      </p:sp>
+      <p:sp>
+        <p:nvSpPr>
+          <p:cNvPr id="4" name="Slide Number Placeholder 3"/>
+          <p:cNvSpPr>
+            <a:spLocks noGrp="1"/>
+          </p:cNvSpPr>
+          <p:nvPr>
+            <p:ph type="sldNum" sz="quarter" idx="10"/>
+          </p:nvPr>
+        </p:nvSpPr>
+        <p:spPr/>
+        <p:txBody>
+          <a:bodyPr/>
+          <a:lstStyle/>
+          <a:p>
+            <a:fld id="{7B5AD275-BDE2-3E4D-BC56-6FC6FA0523E9}" type="slidenum">
+              <a:rPr lang="en-US" smtClean="0"/>
+              <a:pPr/>
+              <a:t>11</a:t>
             </a:fld>
             <a:endParaRPr lang="en-US"/>
           </a:p>
@@ -4664,7 +4940,7 @@
         </p:nvSpPr>
         <p:spPr>
           <a:xfrm>
-            <a:off x="685800" y="1116012"/>
+            <a:off x="685801" y="152400"/>
             <a:ext cx="7772400" cy="1470025"/>
           </a:xfrm>
         </p:spPr>
@@ -4692,8 +4968,8 @@
         </p:nvSpPr>
         <p:spPr>
           <a:xfrm>
-            <a:off x="1371600" y="3200400"/>
-            <a:ext cx="6400800" cy="1752600"/>
+            <a:off x="4419600" y="4919037"/>
+            <a:ext cx="4572000" cy="1752600"/>
           </a:xfrm>
         </p:spPr>
         <p:txBody>
@@ -4745,114 +5021,13 @@
       </p:sp>
       <p:sp>
         <p:nvSpPr>
-          <p:cNvPr id="4" name="TextBox 3"/>
-          <p:cNvSpPr txBox="1"/>
-          <p:nvPr/>
-        </p:nvSpPr>
-        <p:spPr>
-          <a:xfrm>
-            <a:off x="685801" y="2895600"/>
-            <a:ext cx="2362200" cy="2031325"/>
-          </a:xfrm>
-          <a:prstGeom prst="rect">
-            <a:avLst/>
-          </a:prstGeom>
-          <a:noFill/>
-        </p:spPr>
-        <p:txBody>
-          <a:bodyPr wrap="square" rtlCol="0">
-            <a:spAutoFit/>
-          </a:bodyPr>
-          <a:lstStyle/>
-          <a:p>
-            <a:r>
-              <a:rPr lang="en-US" dirty="0" smtClean="0"/>
-              <a:t>Graphic: Sound wave of file</a:t>
-            </a:r>
-          </a:p>
-          <a:p>
-            <a:r>
-              <a:rPr lang="en-US" dirty="0" smtClean="0"/>
-              <a:t>Text transcription of interspersed speaker words without . , ?</a:t>
-            </a:r>
-          </a:p>
-          <a:p>
-            <a:r>
-              <a:rPr lang="en-US" dirty="0" smtClean="0"/>
-              <a:t>Annotated with sentence units</a:t>
-            </a:r>
-          </a:p>
-        </p:txBody>
-      </p:sp>
-      <p:sp>
-        <p:nvSpPr>
-          <p:cNvPr id="5" name="Title 1"/>
-          <p:cNvSpPr txBox="1">
-            <a:spLocks/>
-          </p:cNvSpPr>
-          <p:nvPr/>
-        </p:nvSpPr>
-        <p:spPr>
-          <a:xfrm>
-            <a:off x="228600" y="5486399"/>
-            <a:ext cx="5372100" cy="708025"/>
-          </a:xfrm>
-          <a:prstGeom prst="rect">
-            <a:avLst/>
-          </a:prstGeom>
-        </p:spPr>
-        <p:txBody>
-          <a:bodyPr vert="horz" lIns="91440" tIns="45720" rIns="91440" bIns="45720" rtlCol="0" anchor="ctr">
-            <a:noAutofit/>
-          </a:bodyPr>
-          <a:lstStyle/>
-          <a:p>
-            <a:pPr marL="0" marR="0" lvl="0" indent="0" algn="ctr" defTabSz="457200" rtl="0" eaLnBrk="1" fontAlgn="auto" latinLnBrk="0" hangingPunct="1">
-              <a:lnSpc>
-                <a:spcPct val="100000"/>
-              </a:lnSpc>
-              <a:spcBef>
-                <a:spcPct val="0"/>
-              </a:spcBef>
-              <a:spcAft>
-                <a:spcPts val="0"/>
-              </a:spcAft>
-              <a:buClrTx/>
-              <a:buSzTx/>
-              <a:buFontTx/>
-              <a:buNone/>
-              <a:tabLst/>
-              <a:defRPr/>
-            </a:pPr>
-            <a:r>
-              <a:rPr kumimoji="0" lang="en-US" sz="2800" b="0" i="0" u="none" strike="noStrike" kern="1200" cap="none" spc="0" normalizeH="0" baseline="0" noProof="0" dirty="0" smtClean="0">
-                <a:ln>
-                  <a:noFill/>
-                </a:ln>
-                <a:solidFill>
-                  <a:schemeClr val="tx1"/>
-                </a:solidFill>
-                <a:effectLst/>
-                <a:uLnTx/>
-                <a:uFillTx/>
-                <a:latin typeface="+mj-lt"/>
-                <a:ea typeface="+mj-ea"/>
-                <a:cs typeface="+mj-cs"/>
-              </a:rPr>
-              <a:t>Types of Sentence Units</a:t>
-            </a:r>
-          </a:p>
-        </p:txBody>
-      </p:sp>
-      <p:sp>
-        <p:nvSpPr>
           <p:cNvPr id="6" name="TextBox 5"/>
           <p:cNvSpPr txBox="1"/>
           <p:nvPr/>
         </p:nvSpPr>
         <p:spPr>
           <a:xfrm>
-            <a:off x="6248400" y="5378747"/>
+            <a:off x="6096001" y="2286000"/>
             <a:ext cx="2362200" cy="923330"/>
           </a:xfrm>
           <a:prstGeom prst="rect">
@@ -4876,6 +5051,461 @@
               <a:rPr lang="en-US" dirty="0" smtClean="0"/>
               <a:t>Back Channels Statements</a:t>
             </a:r>
+          </a:p>
+        </p:txBody>
+      </p:sp>
+      <p:pic>
+        <p:nvPicPr>
+          <p:cNvPr id="7" name="Picture 6" descr="garlic_cut.jpg"/>
+          <p:cNvPicPr>
+            <a:picLocks noChangeAspect="1"/>
+          </p:cNvPicPr>
+          <p:nvPr/>
+        </p:nvPicPr>
+        <p:blipFill>
+          <a:blip r:embed="rId3"/>
+          <a:stretch>
+            <a:fillRect/>
+          </a:stretch>
+        </p:blipFill>
+        <p:spPr>
+          <a:xfrm>
+            <a:off x="228600" y="2286000"/>
+            <a:ext cx="5454562" cy="3296612"/>
+          </a:xfrm>
+          <a:prstGeom prst="rect">
+            <a:avLst/>
+          </a:prstGeom>
+        </p:spPr>
+      </p:pic>
+      <p:sp>
+        <p:nvSpPr>
+          <p:cNvPr id="8" name="TextBox 7"/>
+          <p:cNvSpPr txBox="1"/>
+          <p:nvPr/>
+        </p:nvSpPr>
+        <p:spPr>
+          <a:xfrm>
+            <a:off x="685801" y="6394409"/>
+            <a:ext cx="4613650" cy="369332"/>
+          </a:xfrm>
+          <a:prstGeom prst="rect">
+            <a:avLst/>
+          </a:prstGeom>
+          <a:noFill/>
+        </p:spPr>
+        <p:txBody>
+          <a:bodyPr wrap="none" rtlCol="0">
+            <a:spAutoFit/>
+          </a:bodyPr>
+          <a:lstStyle/>
+          <a:p>
+            <a:r>
+              <a:rPr lang="en-US" b="1" dirty="0" smtClean="0">
+                <a:solidFill>
+                  <a:srgbClr val="FF0000"/>
+                </a:solidFill>
+              </a:rPr>
+              <a:t>it has a lot of garlic in it too does </a:t>
+            </a:r>
+            <a:r>
+              <a:rPr lang="en-US" b="1" dirty="0" err="1" smtClean="0">
+                <a:solidFill>
+                  <a:srgbClr val="FF0000"/>
+                </a:solidFill>
+              </a:rPr>
+              <a:t>n't</a:t>
+            </a:r>
+            <a:r>
+              <a:rPr lang="en-US" b="1" dirty="0" smtClean="0">
+                <a:solidFill>
+                  <a:srgbClr val="FF0000"/>
+                </a:solidFill>
+              </a:rPr>
+              <a:t> </a:t>
+            </a:r>
+            <a:r>
+              <a:rPr lang="en-US" b="1" dirty="0" smtClean="0">
+                <a:solidFill>
+                  <a:srgbClr val="FF0000"/>
+                </a:solidFill>
+              </a:rPr>
+              <a:t>it</a:t>
+            </a:r>
+            <a:r>
+              <a:rPr lang="en-US" dirty="0" smtClean="0">
+                <a:solidFill>
+                  <a:srgbClr val="FF0000"/>
+                </a:solidFill>
+              </a:rPr>
+              <a:t> </a:t>
+            </a:r>
+            <a:r>
+              <a:rPr lang="en-US" b="1" dirty="0" err="1" smtClean="0">
+                <a:solidFill>
+                  <a:srgbClr val="0000FF"/>
+                </a:solidFill>
+              </a:rPr>
+              <a:t>i</a:t>
+            </a:r>
+            <a:r>
+              <a:rPr lang="en-US" b="1" dirty="0" smtClean="0">
+                <a:solidFill>
+                  <a:srgbClr val="0000FF"/>
+                </a:solidFill>
+              </a:rPr>
+              <a:t> it </a:t>
+            </a:r>
+            <a:r>
+              <a:rPr lang="en-US" b="1" dirty="0" smtClean="0">
+                <a:solidFill>
+                  <a:srgbClr val="0000FF"/>
+                </a:solidFill>
+              </a:rPr>
+              <a:t>does </a:t>
+            </a:r>
+            <a:endParaRPr lang="en-US" b="1" dirty="0">
+              <a:solidFill>
+                <a:srgbClr val="0000FF"/>
+              </a:solidFill>
+            </a:endParaRPr>
+          </a:p>
+        </p:txBody>
+      </p:sp>
+      <p:sp>
+        <p:nvSpPr>
+          <p:cNvPr id="9" name="TextBox 8"/>
+          <p:cNvSpPr txBox="1"/>
+          <p:nvPr/>
+        </p:nvSpPr>
+        <p:spPr>
+          <a:xfrm>
+            <a:off x="609600" y="1219200"/>
+            <a:ext cx="8077200" cy="3785652"/>
+          </a:xfrm>
+          <a:prstGeom prst="rect">
+            <a:avLst/>
+          </a:prstGeom>
+          <a:noFill/>
+        </p:spPr>
+        <p:txBody>
+          <a:bodyPr wrap="square" rtlCol="0" anchor="ctr">
+            <a:spAutoFit/>
+          </a:bodyPr>
+          <a:lstStyle/>
+          <a:p>
+            <a:r>
+              <a:rPr lang="en-US" sz="3000" b="1" dirty="0" smtClean="0"/>
+              <a:t>LDC2009T01</a:t>
+            </a:r>
+          </a:p>
+          <a:p>
+            <a:r>
+              <a:rPr lang="en-US" sz="3000" dirty="0" smtClean="0"/>
+              <a:t>English CTS Treebank with Structural metadata</a:t>
+            </a:r>
+          </a:p>
+          <a:p>
+            <a:endParaRPr lang="en-US" sz="3000" dirty="0" smtClean="0"/>
+          </a:p>
+          <a:p>
+            <a:r>
+              <a:rPr lang="en-US" sz="3000" b="1" dirty="0" smtClean="0"/>
+              <a:t>Highlights</a:t>
+            </a:r>
+            <a:endParaRPr lang="en-US" sz="3000" b="1" dirty="0" smtClean="0"/>
+          </a:p>
+          <a:p>
+            <a:pPr>
+              <a:buFont typeface="Arial"/>
+              <a:buChar char="•"/>
+            </a:pPr>
+            <a:r>
+              <a:rPr lang="en-US" sz="3000" dirty="0" smtClean="0"/>
+              <a:t> </a:t>
+            </a:r>
+            <a:r>
+              <a:rPr lang="en-US" sz="3000" dirty="0" smtClean="0"/>
+              <a:t>Fisher and Switchboard audio clips</a:t>
+            </a:r>
+            <a:endParaRPr lang="en-US" sz="3000" dirty="0" smtClean="0"/>
+          </a:p>
+          <a:p>
+            <a:pPr>
+              <a:buFont typeface="Arial"/>
+              <a:buChar char="•"/>
+            </a:pPr>
+            <a:r>
+              <a:rPr lang="en-US" sz="3000" dirty="0" smtClean="0"/>
+              <a:t> Transcribed text with time offsets at a word level</a:t>
+            </a:r>
+          </a:p>
+          <a:p>
+            <a:pPr>
+              <a:buFont typeface="Arial"/>
+              <a:buChar char="•"/>
+            </a:pPr>
+            <a:r>
+              <a:rPr lang="en-US" sz="3000" dirty="0" smtClean="0"/>
+              <a:t> Words annotated with </a:t>
+            </a:r>
+            <a:r>
+              <a:rPr lang="en-US" sz="3000" dirty="0" smtClean="0"/>
+              <a:t>POS tags</a:t>
+            </a:r>
+          </a:p>
+          <a:p>
+            <a:pPr>
+              <a:buFont typeface="Arial"/>
+              <a:buChar char="•"/>
+            </a:pPr>
+            <a:r>
+              <a:rPr lang="en-US" sz="3000" dirty="0" smtClean="0"/>
+              <a:t> Sentence units categorized</a:t>
+            </a:r>
+          </a:p>
+        </p:txBody>
+      </p:sp>
+    </p:spTree>
+  </p:cSld>
+  <p:clrMapOvr>
+    <a:masterClrMapping/>
+  </p:clrMapOvr>
+</p:sld>
+</file>
+
+<file path=ppt/slides/slide10.xml><?xml version="1.0" encoding="utf-8"?>
+<p:sld xmlns:a="http://schemas.openxmlformats.org/drawingml/2006/main" xmlns:r="http://schemas.openxmlformats.org/officeDocument/2006/relationships" xmlns:mc="http://schemas.openxmlformats.org/markup-compatibility/2006" xmlns:mv="urn:schemas-microsoft-com:mac:vml" xmlns:p="http://schemas.openxmlformats.org/presentationml/2006/main" mc:Ignorable="mv" mc:PreserveAttributes="mv:*">
+  <p:cSld>
+    <p:spTree>
+      <p:nvGrpSpPr>
+        <p:cNvPr id="1" name=""/>
+        <p:cNvGrpSpPr/>
+        <p:nvPr/>
+      </p:nvGrpSpPr>
+      <p:grpSpPr>
+        <a:xfrm>
+          <a:off x="0" y="0"/>
+          <a:ext cx="0" cy="0"/>
+          <a:chOff x="0" y="0"/>
+          <a:chExt cx="0" cy="0"/>
+        </a:xfrm>
+      </p:grpSpPr>
+      <p:sp>
+        <p:nvSpPr>
+          <p:cNvPr id="2" name="Title 1"/>
+          <p:cNvSpPr>
+            <a:spLocks noGrp="1"/>
+          </p:cNvSpPr>
+          <p:nvPr>
+            <p:ph type="ctrTitle"/>
+          </p:nvPr>
+        </p:nvSpPr>
+        <p:spPr>
+          <a:xfrm>
+            <a:off x="685800" y="1116012"/>
+            <a:ext cx="7772400" cy="1470025"/>
+          </a:xfrm>
+        </p:spPr>
+        <p:txBody>
+          <a:bodyPr>
+            <a:normAutofit/>
+          </a:bodyPr>
+          <a:lstStyle/>
+          <a:p>
+            <a:r>
+              <a:rPr lang="en-US" dirty="0" smtClean="0"/>
+              <a:t>Prosodic features</a:t>
+            </a:r>
+            <a:endParaRPr lang="en-US" dirty="0"/>
+          </a:p>
+        </p:txBody>
+      </p:sp>
+      <p:sp>
+        <p:nvSpPr>
+          <p:cNvPr id="4" name="TextBox 3"/>
+          <p:cNvSpPr txBox="1"/>
+          <p:nvPr/>
+        </p:nvSpPr>
+        <p:spPr>
+          <a:xfrm>
+            <a:off x="2286000" y="2586037"/>
+            <a:ext cx="4876800" cy="923330"/>
+          </a:xfrm>
+          <a:prstGeom prst="rect">
+            <a:avLst/>
+          </a:prstGeom>
+          <a:noFill/>
+        </p:spPr>
+        <p:txBody>
+          <a:bodyPr wrap="square" rtlCol="0">
+            <a:spAutoFit/>
+          </a:bodyPr>
+          <a:lstStyle/>
+          <a:p>
+            <a:r>
+              <a:rPr lang="en-US" dirty="0" err="1" smtClean="0"/>
+              <a:t>n</a:t>
+            </a:r>
+            <a:r>
+              <a:rPr lang="en-US" dirty="0" smtClean="0"/>
+              <a:t>-gram prosodic features</a:t>
+            </a:r>
+          </a:p>
+          <a:p>
+            <a:endParaRPr lang="en-US" dirty="0" smtClean="0"/>
+          </a:p>
+          <a:p>
+            <a:endParaRPr lang="en-US" dirty="0" smtClean="0"/>
+          </a:p>
+        </p:txBody>
+      </p:sp>
+    </p:spTree>
+  </p:cSld>
+  <p:clrMapOvr>
+    <a:masterClrMapping/>
+  </p:clrMapOvr>
+</p:sld>
+</file>
+
+<file path=ppt/slides/slide11.xml><?xml version="1.0" encoding="utf-8"?>
+<p:sld xmlns:a="http://schemas.openxmlformats.org/drawingml/2006/main" xmlns:r="http://schemas.openxmlformats.org/officeDocument/2006/relationships" xmlns:mc="http://schemas.openxmlformats.org/markup-compatibility/2006" xmlns:mv="urn:schemas-microsoft-com:mac:vml" xmlns:p="http://schemas.openxmlformats.org/presentationml/2006/main" mc:Ignorable="mv" mc:PreserveAttributes="mv:*">
+  <p:cSld>
+    <p:spTree>
+      <p:nvGrpSpPr>
+        <p:cNvPr id="1" name=""/>
+        <p:cNvGrpSpPr/>
+        <p:nvPr/>
+      </p:nvGrpSpPr>
+      <p:grpSpPr>
+        <a:xfrm>
+          <a:off x="0" y="0"/>
+          <a:ext cx="0" cy="0"/>
+          <a:chOff x="0" y="0"/>
+          <a:chExt cx="0" cy="0"/>
+        </a:xfrm>
+      </p:grpSpPr>
+      <p:sp>
+        <p:nvSpPr>
+          <p:cNvPr id="2" name="Title 1"/>
+          <p:cNvSpPr>
+            <a:spLocks noGrp="1"/>
+          </p:cNvSpPr>
+          <p:nvPr>
+            <p:ph type="ctrTitle"/>
+          </p:nvPr>
+        </p:nvSpPr>
+        <p:spPr>
+          <a:xfrm>
+            <a:off x="685800" y="1116012"/>
+            <a:ext cx="7772400" cy="1470025"/>
+          </a:xfrm>
+        </p:spPr>
+        <p:txBody>
+          <a:bodyPr>
+            <a:normAutofit/>
+          </a:bodyPr>
+          <a:lstStyle/>
+          <a:p>
+            <a:r>
+              <a:rPr lang="en-US" dirty="0" smtClean="0"/>
+              <a:t>References</a:t>
+            </a:r>
+            <a:endParaRPr lang="en-US" dirty="0"/>
+          </a:p>
+        </p:txBody>
+      </p:sp>
+      <p:sp>
+        <p:nvSpPr>
+          <p:cNvPr id="4" name="TextBox 3"/>
+          <p:cNvSpPr txBox="1"/>
+          <p:nvPr/>
+        </p:nvSpPr>
+        <p:spPr>
+          <a:xfrm>
+            <a:off x="838200" y="2586037"/>
+            <a:ext cx="7848600" cy="1477328"/>
+          </a:xfrm>
+          <a:prstGeom prst="rect">
+            <a:avLst/>
+          </a:prstGeom>
+          <a:noFill/>
+        </p:spPr>
+        <p:txBody>
+          <a:bodyPr wrap="square" rtlCol="0">
+            <a:spAutoFit/>
+          </a:bodyPr>
+          <a:lstStyle/>
+          <a:p>
+            <a:r>
+              <a:rPr lang="en-US" dirty="0"/>
+              <a:t>Enriching Speech Recognition With Automatic Detection of Sentence Boundaries and </a:t>
+            </a:r>
+            <a:r>
+              <a:rPr lang="en-US" dirty="0" err="1" smtClean="0"/>
+              <a:t>Disﬂuencies</a:t>
+            </a:r>
+            <a:r>
+              <a:rPr lang="en-US" dirty="0" smtClean="0"/>
+              <a:t>, Yang Liu</a:t>
+            </a:r>
+            <a:r>
+              <a:rPr lang="en-US" i="1" dirty="0" smtClean="0"/>
+              <a:t>, Elizabeth </a:t>
+            </a:r>
+            <a:r>
+              <a:rPr lang="en-US" i="1" dirty="0" err="1"/>
+              <a:t>Shriberg</a:t>
+            </a:r>
+            <a:r>
+              <a:rPr lang="en-US" i="1" dirty="0"/>
+              <a:t>, Andreas </a:t>
+            </a:r>
+            <a:r>
+              <a:rPr lang="en-US" i="1" dirty="0" err="1"/>
+              <a:t>Stolcke</a:t>
+            </a:r>
+            <a:r>
+              <a:rPr lang="en-US" i="1" dirty="0"/>
+              <a:t>,</a:t>
+            </a:r>
+            <a:r>
+              <a:rPr lang="en-US" i="1" dirty="0" smtClean="0"/>
+              <a:t> Dustin </a:t>
+            </a:r>
+            <a:r>
+              <a:rPr lang="en-US" i="1" dirty="0" err="1"/>
+              <a:t>Hillard</a:t>
+            </a:r>
+            <a:r>
+              <a:rPr lang="en-US" i="1" dirty="0" smtClean="0"/>
+              <a:t>, Mari </a:t>
+            </a:r>
+            <a:r>
+              <a:rPr lang="en-US" i="1" dirty="0" err="1" smtClean="0"/>
+              <a:t>Ostendorf</a:t>
+            </a:r>
+            <a:r>
+              <a:rPr lang="en-US" i="1" dirty="0" smtClean="0"/>
+              <a:t> and </a:t>
+            </a:r>
+            <a:r>
+              <a:rPr lang="en-US" i="1" dirty="0"/>
+              <a:t>Mary </a:t>
+            </a:r>
+            <a:r>
+              <a:rPr lang="en-US" i="1" dirty="0" smtClean="0"/>
+              <a:t>Harper</a:t>
+            </a:r>
+          </a:p>
+          <a:p>
+            <a:r>
+              <a:rPr lang="en-US" dirty="0" smtClean="0"/>
+              <a:t>...</a:t>
+            </a:r>
+          </a:p>
+          <a:p>
+            <a:endParaRPr lang="en-US" dirty="0" smtClean="0"/>
           </a:p>
         </p:txBody>
       </p:sp>
@@ -4906,44 +5536,14 @@
       </p:grpSpPr>
       <p:sp>
         <p:nvSpPr>
-          <p:cNvPr id="2" name="Title 1"/>
-          <p:cNvSpPr>
-            <a:spLocks noGrp="1"/>
-          </p:cNvSpPr>
-          <p:nvPr>
-            <p:ph type="ctrTitle"/>
-          </p:nvPr>
+          <p:cNvPr id="6" name="TextBox 5"/>
+          <p:cNvSpPr txBox="1"/>
+          <p:nvPr/>
         </p:nvSpPr>
         <p:spPr>
           <a:xfrm>
-            <a:off x="685800" y="1116012"/>
-            <a:ext cx="7772400" cy="1470025"/>
-          </a:xfrm>
-        </p:spPr>
-        <p:txBody>
-          <a:bodyPr>
-            <a:normAutofit/>
-          </a:bodyPr>
-          <a:lstStyle/>
-          <a:p>
-            <a:r>
-              <a:rPr lang="en-US" dirty="0" smtClean="0"/>
-              <a:t>Data Used</a:t>
-            </a:r>
-            <a:endParaRPr lang="en-US" dirty="0"/>
-          </a:p>
-        </p:txBody>
-      </p:sp>
-      <p:sp>
-        <p:nvSpPr>
-          <p:cNvPr id="4" name="TextBox 3"/>
-          <p:cNvSpPr txBox="1"/>
-          <p:nvPr/>
-        </p:nvSpPr>
-        <p:spPr>
-          <a:xfrm>
-            <a:off x="1600200" y="2586037"/>
-            <a:ext cx="4876800" cy="1754327"/>
+            <a:off x="1143000" y="5638800"/>
+            <a:ext cx="2362200" cy="923330"/>
           </a:xfrm>
           <a:prstGeom prst="rect">
             <a:avLst/>
@@ -4958,39 +5558,160 @@
           <a:p>
             <a:r>
               <a:rPr lang="en-US" dirty="0" smtClean="0"/>
-              <a:t>LDC2009T01: Annotated metadata</a:t>
+              <a:t>Questions</a:t>
             </a:r>
           </a:p>
           <a:p>
             <a:r>
               <a:rPr lang="en-US" dirty="0" smtClean="0"/>
-              <a:t>Fisher data</a:t>
-            </a:r>
-          </a:p>
+              <a:t>Back Channels Statements</a:t>
+            </a:r>
+          </a:p>
+        </p:txBody>
+      </p:sp>
+      <p:pic>
+        <p:nvPicPr>
+          <p:cNvPr id="7" name="Picture 6" descr="garlic_cut.jpg"/>
+          <p:cNvPicPr>
+            <a:picLocks noChangeAspect="1"/>
+          </p:cNvPicPr>
+          <p:nvPr/>
+        </p:nvPicPr>
+        <p:blipFill>
+          <a:blip r:embed="rId3"/>
+          <a:stretch>
+            <a:fillRect/>
+          </a:stretch>
+        </p:blipFill>
+        <p:spPr>
+          <a:xfrm>
+            <a:off x="228600" y="1622425"/>
+            <a:ext cx="5454562" cy="3296612"/>
+          </a:xfrm>
+          <a:prstGeom prst="rect">
+            <a:avLst/>
+          </a:prstGeom>
+        </p:spPr>
+      </p:pic>
+      <p:sp>
+        <p:nvSpPr>
+          <p:cNvPr id="8" name="TextBox 7"/>
+          <p:cNvSpPr txBox="1"/>
+          <p:nvPr/>
+        </p:nvSpPr>
+        <p:spPr>
+          <a:xfrm>
+            <a:off x="685801" y="4734371"/>
+            <a:ext cx="4613650" cy="369332"/>
+          </a:xfrm>
+          <a:prstGeom prst="rect">
+            <a:avLst/>
+          </a:prstGeom>
+          <a:noFill/>
+        </p:spPr>
+        <p:txBody>
+          <a:bodyPr wrap="none" rtlCol="0">
+            <a:spAutoFit/>
+          </a:bodyPr>
+          <a:lstStyle/>
+          <a:p>
+            <a:r>
+              <a:rPr lang="en-US" b="1" dirty="0" smtClean="0">
+                <a:solidFill>
+                  <a:srgbClr val="FF0000"/>
+                </a:solidFill>
+              </a:rPr>
+              <a:t>it has a lot of garlic in it too does </a:t>
+            </a:r>
+            <a:r>
+              <a:rPr lang="en-US" b="1" dirty="0" err="1" smtClean="0">
+                <a:solidFill>
+                  <a:srgbClr val="FF0000"/>
+                </a:solidFill>
+              </a:rPr>
+              <a:t>n't</a:t>
+            </a:r>
+            <a:r>
+              <a:rPr lang="en-US" b="1" dirty="0" smtClean="0">
+                <a:solidFill>
+                  <a:srgbClr val="FF0000"/>
+                </a:solidFill>
+              </a:rPr>
+              <a:t> </a:t>
+            </a:r>
+            <a:r>
+              <a:rPr lang="en-US" b="1" dirty="0" smtClean="0">
+                <a:solidFill>
+                  <a:srgbClr val="FF0000"/>
+                </a:solidFill>
+              </a:rPr>
+              <a:t>it</a:t>
+            </a:r>
+            <a:r>
+              <a:rPr lang="en-US" dirty="0" smtClean="0">
+                <a:solidFill>
+                  <a:srgbClr val="FF0000"/>
+                </a:solidFill>
+              </a:rPr>
+              <a:t> </a:t>
+            </a:r>
+            <a:r>
+              <a:rPr lang="en-US" b="1" dirty="0" err="1" smtClean="0">
+                <a:solidFill>
+                  <a:srgbClr val="0000FF"/>
+                </a:solidFill>
+              </a:rPr>
+              <a:t>i</a:t>
+            </a:r>
+            <a:r>
+              <a:rPr lang="en-US" b="1" dirty="0" smtClean="0">
+                <a:solidFill>
+                  <a:srgbClr val="0000FF"/>
+                </a:solidFill>
+              </a:rPr>
+              <a:t> it </a:t>
+            </a:r>
+            <a:r>
+              <a:rPr lang="en-US" b="1" dirty="0" smtClean="0">
+                <a:solidFill>
+                  <a:srgbClr val="0000FF"/>
+                </a:solidFill>
+              </a:rPr>
+              <a:t>does </a:t>
+            </a:r>
+            <a:endParaRPr lang="en-US" b="1" dirty="0">
+              <a:solidFill>
+                <a:srgbClr val="0000FF"/>
+              </a:solidFill>
+            </a:endParaRPr>
+          </a:p>
+        </p:txBody>
+      </p:sp>
+      <p:sp>
+        <p:nvSpPr>
+          <p:cNvPr id="10" name="Title 9"/>
+          <p:cNvSpPr>
+            <a:spLocks noGrp="1"/>
+          </p:cNvSpPr>
+          <p:nvPr>
+            <p:ph type="ctrTitle"/>
+          </p:nvPr>
+        </p:nvSpPr>
+        <p:spPr>
+          <a:xfrm>
+            <a:off x="838200" y="0"/>
+            <a:ext cx="7772400" cy="1470025"/>
+          </a:xfrm>
+        </p:spPr>
+        <p:txBody>
+          <a:bodyPr/>
+          <a:lstStyle/>
           <a:p>
             <a:r>
               <a:rPr lang="en-US" dirty="0" smtClean="0"/>
-              <a:t>Switchboard corpus </a:t>
-            </a:r>
-          </a:p>
-          <a:p>
-            <a:r>
-              <a:rPr lang="en-US" dirty="0" smtClean="0"/>
-              <a:t>POS tags</a:t>
-            </a:r>
-          </a:p>
-          <a:p>
-            <a:r>
-              <a:rPr lang="en-US" dirty="0" err="1" smtClean="0"/>
-              <a:t>Disfluencies</a:t>
-            </a:r>
-            <a:r>
-              <a:rPr lang="en-US" dirty="0" smtClean="0"/>
-              <a:t> marked</a:t>
-            </a:r>
-          </a:p>
-          <a:p>
-            <a:endParaRPr lang="en-US" dirty="0" smtClean="0"/>
+              <a:t>The Task</a:t>
+            </a:r>
+            <a:endParaRPr lang="en-US" dirty="0"/>
           </a:p>
         </p:txBody>
       </p:sp>
@@ -5031,8 +5752,8 @@
         </p:nvSpPr>
         <p:spPr>
           <a:xfrm>
-            <a:off x="685800" y="1116012"/>
-            <a:ext cx="7772400" cy="1470025"/>
+            <a:off x="685800" y="1"/>
+            <a:ext cx="7772400" cy="1143000"/>
           </a:xfrm>
         </p:spPr>
         <p:txBody>
@@ -5043,7 +5764,11 @@
           <a:p>
             <a:r>
               <a:rPr lang="en-US" dirty="0" smtClean="0"/>
-              <a:t>Prediction results</a:t>
+              <a:t>Corpus </a:t>
+            </a:r>
+            <a:r>
+              <a:rPr lang="en-US" dirty="0" smtClean="0"/>
+              <a:t>Data Used</a:t>
             </a:r>
             <a:endParaRPr lang="en-US" dirty="0"/>
           </a:p>
@@ -5057,8 +5782,8 @@
         </p:nvSpPr>
         <p:spPr>
           <a:xfrm>
-            <a:off x="1600200" y="2586037"/>
-            <a:ext cx="4876800" cy="646331"/>
+            <a:off x="609600" y="1219200"/>
+            <a:ext cx="8077200" cy="3785652"/>
           </a:xfrm>
           <a:prstGeom prst="rect">
             <a:avLst/>
@@ -5066,14 +5791,79 @@
           <a:noFill/>
         </p:spPr>
         <p:txBody>
-          <a:bodyPr wrap="square" rtlCol="0">
+          <a:bodyPr wrap="square" rtlCol="0" anchor="ctr">
             <a:spAutoFit/>
           </a:bodyPr>
           <a:lstStyle/>
           <a:p>
             <a:r>
-              <a:rPr lang="en-US" dirty="0" smtClean="0"/>
-              <a:t>Final results of predictions with the best features chosen</a:t>
+              <a:rPr lang="en-US" sz="3000" b="1" dirty="0" smtClean="0"/>
+              <a:t>LDC2009T01</a:t>
+            </a:r>
+          </a:p>
+          <a:p>
+            <a:r>
+              <a:rPr lang="en-US" sz="3000" dirty="0" smtClean="0"/>
+              <a:t>English CTS Treebank with Structural metadata</a:t>
+            </a:r>
+          </a:p>
+          <a:p>
+            <a:endParaRPr lang="en-US" sz="3000" dirty="0" smtClean="0"/>
+          </a:p>
+          <a:p>
+            <a:r>
+              <a:rPr lang="en-US" sz="3000" b="1" dirty="0" smtClean="0"/>
+              <a:t>Highlights</a:t>
+            </a:r>
+            <a:endParaRPr lang="en-US" sz="3000" b="1" dirty="0" smtClean="0"/>
+          </a:p>
+          <a:p>
+            <a:pPr>
+              <a:buFont typeface="Arial"/>
+              <a:buChar char="•"/>
+            </a:pPr>
+            <a:r>
+              <a:rPr lang="en-US" sz="3000" dirty="0" smtClean="0"/>
+              <a:t> </a:t>
+            </a:r>
+            <a:r>
+              <a:rPr lang="en-US" sz="3000" dirty="0" smtClean="0"/>
+              <a:t>Fisher and Switchboard audio clips</a:t>
+            </a:r>
+            <a:endParaRPr lang="en-US" sz="3000" dirty="0" smtClean="0"/>
+          </a:p>
+          <a:p>
+            <a:pPr>
+              <a:buFont typeface="Arial"/>
+              <a:buChar char="•"/>
+            </a:pPr>
+            <a:r>
+              <a:rPr lang="en-US" sz="3000" dirty="0" smtClean="0"/>
+              <a:t> Transcribed text with time offsets at a word level</a:t>
+            </a:r>
+          </a:p>
+          <a:p>
+            <a:pPr>
+              <a:buFont typeface="Arial"/>
+              <a:buChar char="•"/>
+            </a:pPr>
+            <a:r>
+              <a:rPr lang="en-US" sz="3000" dirty="0" smtClean="0"/>
+              <a:t> Words annotated with </a:t>
+            </a:r>
+            <a:r>
+              <a:rPr lang="en-US" sz="3000" dirty="0" smtClean="0"/>
+              <a:t>POS tags</a:t>
+            </a:r>
+          </a:p>
+          <a:p>
+            <a:pPr>
+              <a:buFont typeface="Arial"/>
+              <a:buChar char="•"/>
+            </a:pPr>
+            <a:r>
+              <a:rPr lang="en-US" sz="3000" dirty="0" smtClean="0"/>
+              <a:t> Sentence units categorized</a:t>
             </a:r>
           </a:p>
         </p:txBody>
@@ -5127,7 +5917,7 @@
           <a:p>
             <a:r>
               <a:rPr lang="en-US" dirty="0" smtClean="0"/>
-              <a:t>Effect of POS tags</a:t>
+              <a:t>Prediction results</a:t>
             </a:r>
             <a:endParaRPr lang="en-US" dirty="0"/>
           </a:p>
@@ -5142,7 +5932,7 @@
         <p:spPr>
           <a:xfrm>
             <a:off x="1600200" y="2586037"/>
-            <a:ext cx="4876800" cy="1754327"/>
+            <a:ext cx="4876800" cy="646331"/>
           </a:xfrm>
           <a:prstGeom prst="rect">
             <a:avLst/>
@@ -5157,28 +5947,7 @@
           <a:p>
             <a:r>
               <a:rPr lang="en-US" dirty="0" smtClean="0"/>
-              <a:t>Many graphs showing 1-pre-gram, 2-pre-gram, 1-post-gram, 2-post-gram and all of them together</a:t>
-            </a:r>
-          </a:p>
-          <a:p>
-            <a:r>
-              <a:rPr lang="en-US" dirty="0" smtClean="0"/>
-              <a:t>Vary with cross validation bins used?</a:t>
-            </a:r>
-          </a:p>
-          <a:p>
-            <a:r>
-              <a:rPr lang="en-US" dirty="0" smtClean="0"/>
-              <a:t>Vary with many classifiers</a:t>
-            </a:r>
-          </a:p>
-          <a:p>
-            <a:endParaRPr lang="en-US" dirty="0" smtClean="0"/>
-          </a:p>
-          <a:p>
-            <a:r>
-              <a:rPr lang="en-US" dirty="0" smtClean="0"/>
-              <a:t>Above on a per-sentence-unit type basis</a:t>
+              <a:t>Final results of predictions with the best features chosen</a:t>
             </a:r>
           </a:p>
         </p:txBody>
@@ -5232,7 +6001,7 @@
           <a:p>
             <a:r>
               <a:rPr lang="en-US" dirty="0" smtClean="0"/>
-              <a:t>Effect of special words for backchannel identification</a:t>
+              <a:t>Effect of POS tags</a:t>
             </a:r>
             <a:endParaRPr lang="en-US" dirty="0"/>
           </a:p>
@@ -5247,7 +6016,7 @@
         <p:spPr>
           <a:xfrm>
             <a:off x="1600200" y="2586037"/>
-            <a:ext cx="4876800" cy="1477328"/>
+            <a:ext cx="4876800" cy="1754327"/>
           </a:xfrm>
           <a:prstGeom prst="rect">
             <a:avLst/>
@@ -5262,15 +6031,19 @@
           <a:p>
             <a:r>
               <a:rPr lang="en-US" dirty="0" smtClean="0"/>
-              <a:t>Club words like ‘</a:t>
-            </a:r>
-            <a:r>
-              <a:rPr lang="en-US" dirty="0" err="1" smtClean="0"/>
-              <a:t>mhm</a:t>
-            </a:r>
+              <a:t>Many graphs showing 1-pre-gram, 2-pre-gram, 1-post-gram, 2-post-gram and all of them together</a:t>
+            </a:r>
+          </a:p>
+          <a:p>
             <a:r>
               <a:rPr lang="en-US" dirty="0" smtClean="0"/>
-              <a:t>’, ‘oh yeah’ etc into a separate class and see if it helps in predicting backchannel better</a:t>
+              <a:t>Vary with cross validation bins used?</a:t>
+            </a:r>
+          </a:p>
+          <a:p>
+            <a:r>
+              <a:rPr lang="en-US" dirty="0" smtClean="0"/>
+              <a:t>Vary with many classifiers</a:t>
             </a:r>
           </a:p>
           <a:p>
@@ -5279,7 +6052,7 @@
           <a:p>
             <a:r>
               <a:rPr lang="en-US" dirty="0" smtClean="0"/>
-              <a:t>Effects on other sentence units</a:t>
+              <a:t>Above on a per-sentence-unit type basis</a:t>
             </a:r>
           </a:p>
         </p:txBody>
@@ -5332,8 +6105,8 @@
           <a:lstStyle/>
           <a:p>
             <a:r>
-              <a:rPr lang="en-US" smtClean="0"/>
-              <a:t>Miscellaneous features </a:t>
+              <a:rPr lang="en-US" dirty="0" smtClean="0"/>
+              <a:t>Effect of special words for backchannel identification</a:t>
             </a:r>
             <a:endParaRPr lang="en-US" dirty="0"/>
           </a:p>
@@ -5348,7 +6121,7 @@
         <p:spPr>
           <a:xfrm>
             <a:off x="1600200" y="2586037"/>
-            <a:ext cx="4876800" cy="3139321"/>
+            <a:ext cx="4876800" cy="1477328"/>
           </a:xfrm>
           <a:prstGeom prst="rect">
             <a:avLst/>
@@ -5363,7 +6136,15 @@
           <a:p>
             <a:r>
               <a:rPr lang="en-US" dirty="0" smtClean="0"/>
-              <a:t>Previous sentence class prediction (faked as well as true)</a:t>
+              <a:t>Club words like ‘</a:t>
+            </a:r>
+            <a:r>
+              <a:rPr lang="en-US" dirty="0" err="1" smtClean="0"/>
+              <a:t>mhm</a:t>
+            </a:r>
+            <a:r>
+              <a:rPr lang="en-US" dirty="0" smtClean="0"/>
+              <a:t>’, ‘oh yeah’ etc into a separate class and see if it helps in predicting backchannel better</a:t>
             </a:r>
           </a:p>
           <a:p>
@@ -5372,26 +6153,8 @@
           <a:p>
             <a:r>
               <a:rPr lang="en-US" dirty="0" smtClean="0"/>
-              <a:t>Length of sentence so far or number of words so far (that have not been classified yet)</a:t>
-            </a:r>
-          </a:p>
-          <a:p>
-            <a:endParaRPr lang="en-US" dirty="0"/>
-          </a:p>
-          <a:p>
-            <a:endParaRPr lang="en-US" dirty="0" smtClean="0"/>
-          </a:p>
-          <a:p>
-            <a:endParaRPr lang="en-US" dirty="0"/>
-          </a:p>
-          <a:p>
-            <a:endParaRPr lang="en-US" dirty="0" smtClean="0"/>
-          </a:p>
-          <a:p>
-            <a:endParaRPr lang="en-US" dirty="0" smtClean="0"/>
-          </a:p>
-          <a:p>
-            <a:endParaRPr lang="en-US" dirty="0" smtClean="0"/>
+              <a:t>Effects on other sentence units</a:t>
+            </a:r>
           </a:p>
         </p:txBody>
       </p:sp>
@@ -5444,7 +6207,7 @@
           <a:p>
             <a:r>
               <a:rPr lang="en-US" dirty="0" smtClean="0"/>
-              <a:t>Prosodic features</a:t>
+              <a:t>Miscellaneous features </a:t>
             </a:r>
             <a:endParaRPr lang="en-US" dirty="0"/>
           </a:p>
@@ -5474,56 +6237,29 @@
           <a:p>
             <a:r>
               <a:rPr lang="en-US" dirty="0" smtClean="0"/>
-              <a:t>F0</a:t>
-            </a:r>
+              <a:t>Previous sentence class prediction (faked as well as true)</a:t>
+            </a:r>
+          </a:p>
+          <a:p>
+            <a:endParaRPr lang="en-US" dirty="0" smtClean="0"/>
           </a:p>
           <a:p>
             <a:r>
               <a:rPr lang="en-US" dirty="0" smtClean="0"/>
-              <a:t>F0 normalized</a:t>
-            </a:r>
-          </a:p>
-          <a:p>
-            <a:r>
-              <a:rPr lang="en-US" dirty="0" smtClean="0"/>
-              <a:t>Pause duration for speaker</a:t>
-            </a:r>
-          </a:p>
-          <a:p>
-            <a:r>
-              <a:rPr lang="en-US" dirty="0" smtClean="0"/>
-              <a:t>Energy</a:t>
-            </a:r>
-          </a:p>
-          <a:p>
-            <a:r>
-              <a:rPr lang="en-US" dirty="0" smtClean="0"/>
-              <a:t>Length of word</a:t>
-            </a:r>
-          </a:p>
-          <a:p>
-            <a:r>
-              <a:rPr lang="en-US" dirty="0" smtClean="0"/>
-              <a:t>Pause length before word</a:t>
-            </a:r>
-          </a:p>
-          <a:p>
-            <a:r>
-              <a:rPr lang="en-US" dirty="0" smtClean="0"/>
-              <a:t>Word pitch range</a:t>
-            </a:r>
-          </a:p>
-          <a:p>
-            <a:r>
-              <a:rPr lang="en-US" dirty="0" smtClean="0"/>
-              <a:t>Energy</a:t>
-            </a:r>
-          </a:p>
-          <a:p>
-            <a:r>
-              <a:rPr lang="en-US" dirty="0" smtClean="0"/>
-              <a:t>Energy normalized</a:t>
-            </a:r>
+              <a:t>Length of sentence so far or number of words so far (that have not been classified yet)</a:t>
+            </a:r>
+          </a:p>
+          <a:p>
+            <a:endParaRPr lang="en-US" dirty="0"/>
+          </a:p>
+          <a:p>
+            <a:endParaRPr lang="en-US" dirty="0" smtClean="0"/>
+          </a:p>
+          <a:p>
+            <a:endParaRPr lang="en-US" dirty="0"/>
+          </a:p>
+          <a:p>
+            <a:endParaRPr lang="en-US" dirty="0" smtClean="0"/>
           </a:p>
           <a:p>
             <a:endParaRPr lang="en-US" dirty="0" smtClean="0"/>
@@ -5596,8 +6332,8 @@
         </p:nvSpPr>
         <p:spPr>
           <a:xfrm>
-            <a:off x="2286000" y="2586037"/>
-            <a:ext cx="4876800" cy="923330"/>
+            <a:off x="1600200" y="2586037"/>
+            <a:ext cx="4876800" cy="3139321"/>
           </a:xfrm>
           <a:prstGeom prst="rect">
             <a:avLst/>
@@ -5611,12 +6347,56 @@
           <a:lstStyle/>
           <a:p>
             <a:r>
-              <a:rPr lang="en-US" dirty="0" err="1" smtClean="0"/>
-              <a:t>n</a:t>
-            </a:r>
-            <a:r>
               <a:rPr lang="en-US" dirty="0" smtClean="0"/>
-              <a:t>-gram prosodic features</a:t>
+              <a:t>F0</a:t>
+            </a:r>
+          </a:p>
+          <a:p>
+            <a:r>
+              <a:rPr lang="en-US" dirty="0" smtClean="0"/>
+              <a:t>F0 normalized</a:t>
+            </a:r>
+          </a:p>
+          <a:p>
+            <a:r>
+              <a:rPr lang="en-US" dirty="0" smtClean="0"/>
+              <a:t>Pause duration for speaker</a:t>
+            </a:r>
+          </a:p>
+          <a:p>
+            <a:r>
+              <a:rPr lang="en-US" dirty="0" smtClean="0"/>
+              <a:t>Energy</a:t>
+            </a:r>
+          </a:p>
+          <a:p>
+            <a:r>
+              <a:rPr lang="en-US" dirty="0" smtClean="0"/>
+              <a:t>Length of word</a:t>
+            </a:r>
+          </a:p>
+          <a:p>
+            <a:r>
+              <a:rPr lang="en-US" dirty="0" smtClean="0"/>
+              <a:t>Pause length before word</a:t>
+            </a:r>
+          </a:p>
+          <a:p>
+            <a:r>
+              <a:rPr lang="en-US" dirty="0" smtClean="0"/>
+              <a:t>Word pitch range</a:t>
+            </a:r>
+          </a:p>
+          <a:p>
+            <a:r>
+              <a:rPr lang="en-US" dirty="0" smtClean="0"/>
+              <a:t>Energy</a:t>
+            </a:r>
+          </a:p>
+          <a:p>
+            <a:r>
+              <a:rPr lang="en-US" dirty="0" smtClean="0"/>
+              <a:t>Energy normalized</a:t>
             </a:r>
           </a:p>
           <a:p>
@@ -5676,7 +6456,7 @@
           <a:p>
             <a:r>
               <a:rPr lang="en-US" dirty="0" smtClean="0"/>
-              <a:t>References</a:t>
+              <a:t>Prosodic features</a:t>
             </a:r>
             <a:endParaRPr lang="en-US" dirty="0"/>
           </a:p>
@@ -5690,8 +6470,8 @@
         </p:nvSpPr>
         <p:spPr>
           <a:xfrm>
-            <a:off x="838200" y="2586037"/>
-            <a:ext cx="7848600" cy="1477328"/>
+            <a:off x="1600200" y="2586037"/>
+            <a:ext cx="4876800" cy="3139321"/>
           </a:xfrm>
           <a:prstGeom prst="rect">
             <a:avLst/>
@@ -5705,71 +6485,60 @@
           <a:lstStyle/>
           <a:p>
             <a:r>
-              <a:rPr lang="en-US" dirty="0"/>
-              <a:t>Enriching Speech Recognition With Automatic Detection of Sentence Boundaries and </a:t>
-            </a:r>
-            <a:r>
-              <a:rPr lang="en-US" dirty="0" err="1" smtClean="0"/>
-              <a:t>Disﬂuencies</a:t>
-            </a:r>
-            <a:r>
               <a:rPr lang="en-US" dirty="0" smtClean="0"/>
-              <a:t>, Yang Liu</a:t>
-            </a:r>
-            <a:r>
-              <a:rPr lang="en-US" i="1" dirty="0" smtClean="0"/>
-              <a:t>, Elizabeth </a:t>
-            </a:r>
-            <a:r>
-              <a:rPr lang="en-US" i="1" dirty="0" err="1"/>
-              <a:t>Shriberg</a:t>
-            </a:r>
-            <a:r>
-              <a:rPr lang="en-US" i="1" dirty="0"/>
-              <a:t>, Andreas </a:t>
-            </a:r>
-            <a:r>
-              <a:rPr lang="en-US" i="1" dirty="0" err="1"/>
-              <a:t>Stolcke</a:t>
-            </a:r>
-            <a:r>
-              <a:rPr lang="en-US" i="1" dirty="0"/>
-              <a:t>,</a:t>
-            </a:r>
-            <a:r>
-              <a:rPr lang="en-US" i="1" dirty="0" smtClean="0"/>
-              <a:t> Dustin </a:t>
-            </a:r>
-            <a:r>
-              <a:rPr lang="en-US" i="1" dirty="0" err="1"/>
-              <a:t>Hillard</a:t>
-            </a:r>
-            <a:r>
-              <a:rPr lang="en-US" i="1" dirty="0" smtClean="0"/>
-              <a:t>, Mari </a:t>
-            </a:r>
-            <a:r>
-              <a:rPr lang="en-US" i="1" dirty="0" err="1" smtClean="0"/>
-              <a:t>Ostendorf</a:t>
-            </a:r>
-            <a:r>
-              <a:rPr lang="en-US" i="1" dirty="0" smtClean="0"/>
-              <a:t> and </a:t>
-            </a:r>
-            <a:r>
-              <a:rPr lang="en-US" i="1" dirty="0"/>
-              <a:t>Mary </a:t>
-            </a:r>
-            <a:r>
-              <a:rPr lang="en-US" i="1" dirty="0" smtClean="0"/>
-              <a:t>Harper</a:t>
+              <a:t>F0</a:t>
             </a:r>
           </a:p>
           <a:p>
             <a:r>
               <a:rPr lang="en-US" dirty="0" smtClean="0"/>
-              <a:t>...</a:t>
-            </a:r>
+              <a:t>F0 normalized</a:t>
+            </a:r>
+          </a:p>
+          <a:p>
+            <a:r>
+              <a:rPr lang="en-US" dirty="0" smtClean="0"/>
+              <a:t>Pause duration for speaker</a:t>
+            </a:r>
+          </a:p>
+          <a:p>
+            <a:r>
+              <a:rPr lang="en-US" dirty="0" smtClean="0"/>
+              <a:t>Energy</a:t>
+            </a:r>
+          </a:p>
+          <a:p>
+            <a:r>
+              <a:rPr lang="en-US" dirty="0" smtClean="0"/>
+              <a:t>Length of word</a:t>
+            </a:r>
+          </a:p>
+          <a:p>
+            <a:r>
+              <a:rPr lang="en-US" dirty="0" smtClean="0"/>
+              <a:t>Pause length before word</a:t>
+            </a:r>
+          </a:p>
+          <a:p>
+            <a:r>
+              <a:rPr lang="en-US" dirty="0" smtClean="0"/>
+              <a:t>Word pitch range</a:t>
+            </a:r>
+          </a:p>
+          <a:p>
+            <a:r>
+              <a:rPr lang="en-US" dirty="0" smtClean="0"/>
+              <a:t>Energy</a:t>
+            </a:r>
+          </a:p>
+          <a:p>
+            <a:r>
+              <a:rPr lang="en-US" dirty="0" smtClean="0"/>
+              <a:t>Energy normalized</a:t>
+            </a:r>
+          </a:p>
+          <a:p>
+            <a:endParaRPr lang="en-US" dirty="0" smtClean="0"/>
           </a:p>
           <a:p>
             <a:endParaRPr lang="en-US" dirty="0" smtClean="0"/>

</xml_diff>